<commit_message>
un test ajouté toggle-all active
</commit_message>
<xml_diff>
--- a/Présentation/Présentation Soutenance.pptx
+++ b/Présentation/Présentation Soutenance.pptx
@@ -306,7 +306,7 @@
           <a:p>
             <a:fld id="{A8B6E2BB-5D6E-4C5A-AF8D-EB2315DDE3FA}" type="datetimeFigureOut">
               <a:rPr lang="en-US" smtClean="0"/>
-              <a:t>7/11/2019</a:t>
+              <a:t>7/12/2019</a:t>
             </a:fld>
             <a:endParaRPr lang="en-US"/>
           </a:p>
@@ -644,7 +644,7 @@
           <a:p>
             <a:fld id="{A8B6E2BB-5D6E-4C5A-AF8D-EB2315DDE3FA}" type="datetimeFigureOut">
               <a:rPr lang="en-US" smtClean="0"/>
-              <a:t>7/11/2019</a:t>
+              <a:t>7/12/2019</a:t>
             </a:fld>
             <a:endParaRPr lang="en-US"/>
           </a:p>
@@ -1045,7 +1045,7 @@
           <a:p>
             <a:fld id="{A8B6E2BB-5D6E-4C5A-AF8D-EB2315DDE3FA}" type="datetimeFigureOut">
               <a:rPr lang="en-US" smtClean="0"/>
-              <a:t>7/11/2019</a:t>
+              <a:t>7/12/2019</a:t>
             </a:fld>
             <a:endParaRPr lang="en-US"/>
           </a:p>
@@ -1381,7 +1381,7 @@
           <a:p>
             <a:fld id="{A8B6E2BB-5D6E-4C5A-AF8D-EB2315DDE3FA}" type="datetimeFigureOut">
               <a:rPr lang="en-US" smtClean="0"/>
-              <a:t>7/11/2019</a:t>
+              <a:t>7/12/2019</a:t>
             </a:fld>
             <a:endParaRPr lang="en-US"/>
           </a:p>
@@ -1701,7 +1701,7 @@
           <a:p>
             <a:fld id="{A8B6E2BB-5D6E-4C5A-AF8D-EB2315DDE3FA}" type="datetimeFigureOut">
               <a:rPr lang="en-US" smtClean="0"/>
-              <a:t>7/11/2019</a:t>
+              <a:t>7/12/2019</a:t>
             </a:fld>
             <a:endParaRPr lang="en-US"/>
           </a:p>
@@ -2097,7 +2097,7 @@
           <a:p>
             <a:fld id="{A8B6E2BB-5D6E-4C5A-AF8D-EB2315DDE3FA}" type="datetimeFigureOut">
               <a:rPr lang="en-US" smtClean="0"/>
-              <a:t>7/11/2019</a:t>
+              <a:t>7/12/2019</a:t>
             </a:fld>
             <a:endParaRPr lang="en-US"/>
           </a:p>
@@ -2354,7 +2354,7 @@
           <a:p>
             <a:fld id="{A8B6E2BB-5D6E-4C5A-AF8D-EB2315DDE3FA}" type="datetimeFigureOut">
               <a:rPr lang="en-US" smtClean="0"/>
-              <a:t>7/11/2019</a:t>
+              <a:t>7/12/2019</a:t>
             </a:fld>
             <a:endParaRPr lang="en-US"/>
           </a:p>
@@ -2616,7 +2616,7 @@
           <a:p>
             <a:fld id="{A8B6E2BB-5D6E-4C5A-AF8D-EB2315DDE3FA}" type="datetimeFigureOut">
               <a:rPr lang="en-US" smtClean="0"/>
-              <a:t>7/11/2019</a:t>
+              <a:t>7/12/2019</a:t>
             </a:fld>
             <a:endParaRPr lang="en-US"/>
           </a:p>
@@ -2878,7 +2878,7 @@
           <a:p>
             <a:fld id="{A8B6E2BB-5D6E-4C5A-AF8D-EB2315DDE3FA}" type="datetimeFigureOut">
               <a:rPr lang="en-US" smtClean="0"/>
-              <a:t>7/11/2019</a:t>
+              <a:t>7/12/2019</a:t>
             </a:fld>
             <a:endParaRPr lang="en-US"/>
           </a:p>
@@ -3207,7 +3207,7 @@
           <a:p>
             <a:fld id="{A8B6E2BB-5D6E-4C5A-AF8D-EB2315DDE3FA}" type="datetimeFigureOut">
               <a:rPr lang="en-US" smtClean="0"/>
-              <a:t>7/11/2019</a:t>
+              <a:t>7/12/2019</a:t>
             </a:fld>
             <a:endParaRPr lang="en-US"/>
           </a:p>
@@ -3530,7 +3530,7 @@
           <a:p>
             <a:fld id="{A8B6E2BB-5D6E-4C5A-AF8D-EB2315DDE3FA}" type="datetimeFigureOut">
               <a:rPr lang="en-US" smtClean="0"/>
-              <a:t>7/11/2019</a:t>
+              <a:t>7/12/2019</a:t>
             </a:fld>
             <a:endParaRPr lang="en-US"/>
           </a:p>
@@ -3987,7 +3987,7 @@
           <a:p>
             <a:fld id="{A8B6E2BB-5D6E-4C5A-AF8D-EB2315DDE3FA}" type="datetimeFigureOut">
               <a:rPr lang="en-US" smtClean="0"/>
-              <a:t>7/11/2019</a:t>
+              <a:t>7/12/2019</a:t>
             </a:fld>
             <a:endParaRPr lang="en-US"/>
           </a:p>
@@ -4192,7 +4192,7 @@
           <a:p>
             <a:fld id="{A8B6E2BB-5D6E-4C5A-AF8D-EB2315DDE3FA}" type="datetimeFigureOut">
               <a:rPr lang="en-US" smtClean="0"/>
-              <a:t>7/11/2019</a:t>
+              <a:t>7/12/2019</a:t>
             </a:fld>
             <a:endParaRPr lang="en-US"/>
           </a:p>
@@ -4369,7 +4369,7 @@
           <a:p>
             <a:fld id="{A8B6E2BB-5D6E-4C5A-AF8D-EB2315DDE3FA}" type="datetimeFigureOut">
               <a:rPr lang="en-US" smtClean="0"/>
-              <a:t>7/11/2019</a:t>
+              <a:t>7/12/2019</a:t>
             </a:fld>
             <a:endParaRPr lang="en-US"/>
           </a:p>
@@ -4702,7 +4702,7 @@
           <a:p>
             <a:fld id="{A8B6E2BB-5D6E-4C5A-AF8D-EB2315DDE3FA}" type="datetimeFigureOut">
               <a:rPr lang="en-US" smtClean="0"/>
-              <a:t>7/11/2019</a:t>
+              <a:t>7/12/2019</a:t>
             </a:fld>
             <a:endParaRPr lang="en-US"/>
           </a:p>
@@ -5047,7 +5047,7 @@
           <a:p>
             <a:fld id="{A8B6E2BB-5D6E-4C5A-AF8D-EB2315DDE3FA}" type="datetimeFigureOut">
               <a:rPr lang="en-US" smtClean="0"/>
-              <a:t>7/11/2019</a:t>
+              <a:t>7/12/2019</a:t>
             </a:fld>
             <a:endParaRPr lang="en-US"/>
           </a:p>
@@ -7164,7 +7164,7 @@
           <a:p>
             <a:fld id="{A8B6E2BB-5D6E-4C5A-AF8D-EB2315DDE3FA}" type="datetimeFigureOut">
               <a:rPr lang="en-US" smtClean="0"/>
-              <a:t>7/11/2019</a:t>
+              <a:t>7/12/2019</a:t>
             </a:fld>
             <a:endParaRPr lang="en-US"/>
           </a:p>
@@ -8436,7 +8436,7 @@
         <p:spPr>
           <a:xfrm>
             <a:off x="3217985" y="1397977"/>
-            <a:ext cx="8642838" cy="4770537"/>
+            <a:ext cx="8642838" cy="5262979"/>
           </a:xfrm>
           <a:prstGeom prst="rect">
             <a:avLst/>
@@ -8488,11 +8488,7 @@
             <a:pPr algn="just"/>
             <a:r>
               <a:rPr lang="fr-FR" sz="1600" dirty="0" smtClean="0"/>
-              <a:t>Pas de tests d’intégration (insertion du programme avec d’autres logiciels</a:t>
-            </a:r>
-            <a:r>
-              <a:rPr lang="fr-FR" sz="1600" smtClean="0"/>
-              <a:t>, technologie)</a:t>
+              <a:t>Pas de tests d’intégration (insertion du programme avec d’autres logiciels, technologie)</a:t>
             </a:r>
             <a:endParaRPr lang="fr-FR" sz="1600" dirty="0"/>
           </a:p>
@@ -8587,6 +8583,40 @@
               <a:rPr lang="en-GB" sz="1600" dirty="0" smtClean="0"/>
               <a:t>view</a:t>
             </a:r>
+          </a:p>
+          <a:p>
+            <a:pPr marL="285750" indent="-285750">
+              <a:buFont typeface="Courier New" panose="02070309020205020404" pitchFamily="49" charset="0"/>
+              <a:buChar char="o"/>
+            </a:pPr>
+            <a:endParaRPr lang="en-GB" sz="1600" dirty="0"/>
+          </a:p>
+          <a:p>
+            <a:pPr marL="285750" indent="-285750">
+              <a:buFont typeface="Courier New" panose="02070309020205020404" pitchFamily="49" charset="0"/>
+              <a:buChar char="o"/>
+            </a:pPr>
+            <a:r>
+              <a:rPr lang="en-GB" sz="1600" dirty="0" err="1" smtClean="0"/>
+              <a:t>Ligne</a:t>
+            </a:r>
+            <a:r>
+              <a:rPr lang="en-GB" sz="1600" dirty="0" smtClean="0"/>
+              <a:t> 282 </a:t>
+            </a:r>
+            <a:r>
+              <a:rPr lang="en-GB" sz="1600" dirty="0"/>
+              <a:t>: should toggle all </a:t>
+            </a:r>
+            <a:r>
+              <a:rPr lang="en-GB" sz="1600" dirty="0" err="1"/>
+              <a:t>todos</a:t>
+            </a:r>
+            <a:r>
+              <a:rPr lang="en-GB" sz="1600" dirty="0"/>
+              <a:t> to active</a:t>
+            </a:r>
+            <a:endParaRPr lang="en-GB" sz="1600" dirty="0" smtClean="0"/>
           </a:p>
           <a:p>
             <a:endParaRPr lang="fr-FR" sz="1600" dirty="0" smtClean="0"/>

</xml_diff>